<commit_message>
Updated the Product Definition
</commit_message>
<xml_diff>
--- a/Product Definition/Product definition.pptx
+++ b/Product Definition/Product definition.pptx
@@ -6004,14 +6004,30 @@
               <a:buNone/>
             </a:pPr>
             <a:r>
-              <a:rPr lang="en-GB" dirty="0">
+              <a:rPr lang="en-GB" sz="1600" dirty="0">
                 <a:solidFill>
                   <a:schemeClr val="tx1"/>
                 </a:solidFill>
               </a:rPr>
-              <a:t>Project repo: &lt;https://github.com/xpjllk38324/Data-visionaries&gt;</a:t>
+              <a:t>Project repo: &lt;https://</a:t>
             </a:r>
-            <a:endParaRPr dirty="0">
+            <a:r>
+              <a:rPr lang="en-GB" sz="1600" dirty="0" err="1">
+                <a:solidFill>
+                  <a:schemeClr val="tx1"/>
+                </a:solidFill>
+              </a:rPr>
+              <a:t>github.com</a:t>
+            </a:r>
+            <a:r>
+              <a:rPr lang="en-GB" sz="1600" dirty="0">
+                <a:solidFill>
+                  <a:schemeClr val="tx1"/>
+                </a:solidFill>
+              </a:rPr>
+              <a:t>/xpjllk38324/Container-Security-Scanning-Service&gt;</a:t>
+            </a:r>
+            <a:endParaRPr sz="1600" dirty="0">
               <a:solidFill>
                 <a:schemeClr val="tx1"/>
               </a:solidFill>
@@ -6028,12 +6044,28 @@
               <a:buNone/>
             </a:pPr>
             <a:r>
-              <a:rPr lang="en-GB" dirty="0">
+              <a:rPr lang="en-GB" sz="1600" dirty="0">
                 <a:solidFill>
                   <a:schemeClr val="tx1"/>
                 </a:solidFill>
               </a:rPr>
-              <a:t>This report: &lt;provide a link&gt;</a:t>
+              <a:t>This report: &lt;https://</a:t>
+            </a:r>
+            <a:r>
+              <a:rPr lang="en-GB" sz="1600" dirty="0" err="1">
+                <a:solidFill>
+                  <a:schemeClr val="tx1"/>
+                </a:solidFill>
+              </a:rPr>
+              <a:t>github.com</a:t>
+            </a:r>
+            <a:r>
+              <a:rPr lang="en-GB" sz="1600" dirty="0">
+                <a:solidFill>
+                  <a:schemeClr val="tx1"/>
+                </a:solidFill>
+              </a:rPr>
+              <a:t>/xpjllk38324/Container-Security-Scanning-Service/blob/main/Product%20Definition/Product%20Definition.pptx&gt;</a:t>
             </a:r>
             <a:endParaRPr dirty="0">
               <a:solidFill>

</xml_diff>